<commit_message>
feat: Fix google traslate
</commit_message>
<xml_diff>
--- a/mamatrabajo.pptx
+++ b/mamatrabajo.pptx
@@ -256,7 +256,7 @@
           <a:p>
             <a:fld id="{2A1FE4CF-BAF3-4040-9B57-B94CAD1FC14A}" type="datetimeFigureOut">
               <a:rPr lang="en-US" smtClean="0"/>
-              <a:t>1/22/2025</a:t>
+              <a:t>2/12/2025</a:t>
             </a:fld>
             <a:endParaRPr lang="en-US"/>
           </a:p>
@@ -426,7 +426,7 @@
           <a:p>
             <a:fld id="{2A1FE4CF-BAF3-4040-9B57-B94CAD1FC14A}" type="datetimeFigureOut">
               <a:rPr lang="en-US" smtClean="0"/>
-              <a:t>1/22/2025</a:t>
+              <a:t>2/12/2025</a:t>
             </a:fld>
             <a:endParaRPr lang="en-US"/>
           </a:p>
@@ -606,7 +606,7 @@
           <a:p>
             <a:fld id="{2A1FE4CF-BAF3-4040-9B57-B94CAD1FC14A}" type="datetimeFigureOut">
               <a:rPr lang="en-US" smtClean="0"/>
-              <a:t>1/22/2025</a:t>
+              <a:t>2/12/2025</a:t>
             </a:fld>
             <a:endParaRPr lang="en-US"/>
           </a:p>
@@ -776,7 +776,7 @@
           <a:p>
             <a:fld id="{2A1FE4CF-BAF3-4040-9B57-B94CAD1FC14A}" type="datetimeFigureOut">
               <a:rPr lang="en-US" smtClean="0"/>
-              <a:t>1/22/2025</a:t>
+              <a:t>2/12/2025</a:t>
             </a:fld>
             <a:endParaRPr lang="en-US"/>
           </a:p>
@@ -1020,7 +1020,7 @@
           <a:p>
             <a:fld id="{2A1FE4CF-BAF3-4040-9B57-B94CAD1FC14A}" type="datetimeFigureOut">
               <a:rPr lang="en-US" smtClean="0"/>
-              <a:t>1/22/2025</a:t>
+              <a:t>2/12/2025</a:t>
             </a:fld>
             <a:endParaRPr lang="en-US"/>
           </a:p>
@@ -1252,7 +1252,7 @@
           <a:p>
             <a:fld id="{2A1FE4CF-BAF3-4040-9B57-B94CAD1FC14A}" type="datetimeFigureOut">
               <a:rPr lang="en-US" smtClean="0"/>
-              <a:t>1/22/2025</a:t>
+              <a:t>2/12/2025</a:t>
             </a:fld>
             <a:endParaRPr lang="en-US"/>
           </a:p>
@@ -1619,7 +1619,7 @@
           <a:p>
             <a:fld id="{2A1FE4CF-BAF3-4040-9B57-B94CAD1FC14A}" type="datetimeFigureOut">
               <a:rPr lang="en-US" smtClean="0"/>
-              <a:t>1/22/2025</a:t>
+              <a:t>2/12/2025</a:t>
             </a:fld>
             <a:endParaRPr lang="en-US"/>
           </a:p>
@@ -1737,7 +1737,7 @@
           <a:p>
             <a:fld id="{2A1FE4CF-BAF3-4040-9B57-B94CAD1FC14A}" type="datetimeFigureOut">
               <a:rPr lang="en-US" smtClean="0"/>
-              <a:t>1/22/2025</a:t>
+              <a:t>2/12/2025</a:t>
             </a:fld>
             <a:endParaRPr lang="en-US"/>
           </a:p>
@@ -1832,7 +1832,7 @@
           <a:p>
             <a:fld id="{2A1FE4CF-BAF3-4040-9B57-B94CAD1FC14A}" type="datetimeFigureOut">
               <a:rPr lang="en-US" smtClean="0"/>
-              <a:t>1/22/2025</a:t>
+              <a:t>2/12/2025</a:t>
             </a:fld>
             <a:endParaRPr lang="en-US"/>
           </a:p>
@@ -2109,7 +2109,7 @@
           <a:p>
             <a:fld id="{2A1FE4CF-BAF3-4040-9B57-B94CAD1FC14A}" type="datetimeFigureOut">
               <a:rPr lang="en-US" smtClean="0"/>
-              <a:t>1/22/2025</a:t>
+              <a:t>2/12/2025</a:t>
             </a:fld>
             <a:endParaRPr lang="en-US"/>
           </a:p>
@@ -2366,7 +2366,7 @@
           <a:p>
             <a:fld id="{2A1FE4CF-BAF3-4040-9B57-B94CAD1FC14A}" type="datetimeFigureOut">
               <a:rPr lang="en-US" smtClean="0"/>
-              <a:t>1/22/2025</a:t>
+              <a:t>2/12/2025</a:t>
             </a:fld>
             <a:endParaRPr lang="en-US"/>
           </a:p>
@@ -2579,7 +2579,7 @@
           <a:p>
             <a:fld id="{2A1FE4CF-BAF3-4040-9B57-B94CAD1FC14A}" type="datetimeFigureOut">
               <a:rPr lang="en-US" smtClean="0"/>
-              <a:t>1/22/2025</a:t>
+              <a:t>2/12/2025</a:t>
             </a:fld>
             <a:endParaRPr lang="en-US"/>
           </a:p>
@@ -3082,7 +3082,15 @@
                   <a:schemeClr val="tx1"/>
                 </a:solidFill>
               </a:rPr>
-              <a:t>3111 5766</a:t>
+              <a:t>3111 </a:t>
+            </a:r>
+            <a:r>
+              <a:rPr lang="es-MX" sz="7200" dirty="0" smtClean="0">
+                <a:solidFill>
+                  <a:schemeClr val="tx1"/>
+                </a:solidFill>
+              </a:rPr>
+              <a:t>5792</a:t>
             </a:r>
             <a:endParaRPr lang="en-US" dirty="0">
               <a:solidFill>
@@ -3177,15 +3185,15 @@
                   <a:schemeClr val="tx1"/>
                 </a:solidFill>
               </a:rPr>
-              <a:t> </a:t>
-            </a:r>
-            <a:r>
-              <a:rPr lang="es-MX" sz="7200" dirty="0">
-                <a:solidFill>
-                  <a:schemeClr val="tx1"/>
-                </a:solidFill>
-              </a:rPr>
-              <a:t>3111 5766</a:t>
+              <a:t> 3111 </a:t>
+            </a:r>
+            <a:r>
+              <a:rPr lang="es-MX" sz="7200" dirty="0" smtClean="0">
+                <a:solidFill>
+                  <a:schemeClr val="tx1"/>
+                </a:solidFill>
+              </a:rPr>
+              <a:t>5792</a:t>
             </a:r>
             <a:endParaRPr lang="en-US" sz="7200" dirty="0">
               <a:solidFill>
@@ -3280,15 +3288,7 @@
                   <a:schemeClr val="tx1"/>
                 </a:solidFill>
               </a:rPr>
-              <a:t> </a:t>
-            </a:r>
-            <a:r>
-              <a:rPr lang="es-MX" sz="7200" dirty="0">
-                <a:solidFill>
-                  <a:schemeClr val="tx1"/>
-                </a:solidFill>
-              </a:rPr>
-              <a:t>3111 </a:t>
+              <a:t> 3111 </a:t>
             </a:r>
             <a:r>
               <a:rPr lang="es-MX" sz="7200" dirty="0" smtClean="0">
@@ -3296,7 +3296,7 @@
                   <a:schemeClr val="tx1"/>
                 </a:solidFill>
               </a:rPr>
-              <a:t>5766</a:t>
+              <a:t>5792</a:t>
             </a:r>
             <a:endParaRPr lang="en-US" sz="7200" dirty="0">
               <a:solidFill>
@@ -3399,15 +3399,7 @@
                   <a:schemeClr val="tx1"/>
                 </a:solidFill>
               </a:rPr>
-              <a:t> </a:t>
-            </a:r>
-            <a:r>
-              <a:rPr lang="es-MX" sz="7200" dirty="0">
-                <a:solidFill>
-                  <a:schemeClr val="tx1"/>
-                </a:solidFill>
-              </a:rPr>
-              <a:t>3111 </a:t>
+              <a:t> 3111 </a:t>
             </a:r>
             <a:r>
               <a:rPr lang="es-MX" sz="7200" dirty="0" smtClean="0">
@@ -3415,7 +3407,7 @@
                   <a:schemeClr val="tx1"/>
                 </a:solidFill>
               </a:rPr>
-              <a:t>5766</a:t>
+              <a:t>5792</a:t>
             </a:r>
             <a:endParaRPr lang="en-US" sz="7200" dirty="0">
               <a:solidFill>
@@ -8610,6 +8602,119 @@
         <p:spPr>
           <a:xfrm>
             <a:off x="52252" y="212582"/>
+            <a:ext cx="4545874" cy="3970318"/>
+          </a:xfrm>
+          <a:prstGeom prst="rect">
+            <a:avLst/>
+          </a:prstGeom>
+          <a:ln>
+            <a:noFill/>
+          </a:ln>
+        </p:spPr>
+        <p:style>
+          <a:lnRef idx="2">
+            <a:schemeClr val="dk1"/>
+          </a:lnRef>
+          <a:fillRef idx="1">
+            <a:schemeClr val="lt1"/>
+          </a:fillRef>
+          <a:effectRef idx="0">
+            <a:schemeClr val="dk1"/>
+          </a:effectRef>
+          <a:fontRef idx="minor">
+            <a:schemeClr val="dk1"/>
+          </a:fontRef>
+        </p:style>
+        <p:txBody>
+          <a:bodyPr wrap="square" rtlCol="0">
+            <a:spAutoFit/>
+          </a:bodyPr>
+          <a:lstStyle/>
+          <a:p>
+            <a:r>
+              <a:rPr lang="es-MX" dirty="0"/>
+              <a:t> </a:t>
+            </a:r>
+            <a:r>
+              <a:rPr lang="es-MX" dirty="0" smtClean="0"/>
+              <a:t>           </a:t>
+            </a:r>
+          </a:p>
+          <a:p>
+            <a:r>
+              <a:rPr lang="es-MX" dirty="0"/>
+              <a:t> </a:t>
+            </a:r>
+            <a:r>
+              <a:rPr lang="es-MX" dirty="0" smtClean="0"/>
+              <a:t>          </a:t>
+            </a:r>
+            <a:r>
+              <a:rPr lang="es-MX" sz="7200" dirty="0" smtClean="0">
+                <a:solidFill>
+                  <a:schemeClr val="tx1"/>
+                </a:solidFill>
+              </a:rPr>
+              <a:t>BULTO</a:t>
+            </a:r>
+            <a:r>
+              <a:rPr lang="en-US" sz="7200" dirty="0" smtClean="0">
+                <a:solidFill>
+                  <a:schemeClr val="tx1"/>
+                </a:solidFill>
+              </a:rPr>
+              <a:t>#9</a:t>
+            </a:r>
+          </a:p>
+          <a:p>
+            <a:r>
+              <a:rPr lang="es-MX" sz="7200" dirty="0" smtClean="0">
+                <a:solidFill>
+                  <a:schemeClr val="tx1"/>
+                </a:solidFill>
+              </a:rPr>
+              <a:t>    FREEZER</a:t>
+            </a:r>
+            <a:r>
+              <a:rPr lang="es-MX" sz="7200" dirty="0" smtClean="0">
+                <a:solidFill>
+                  <a:schemeClr val="tx1"/>
+                </a:solidFill>
+              </a:rPr>
+              <a:t>		</a:t>
+            </a:r>
+            <a:endParaRPr lang="en-US" sz="7200" dirty="0">
+              <a:solidFill>
+                <a:schemeClr val="tx1"/>
+              </a:solidFill>
+            </a:endParaRPr>
+          </a:p>
+          <a:p>
+            <a:r>
+              <a:rPr lang="es-MX" dirty="0" smtClean="0">
+                <a:solidFill>
+                  <a:srgbClr val="0070C0"/>
+                </a:solidFill>
+              </a:rPr>
+              <a:t> </a:t>
+            </a:r>
+            <a:endParaRPr lang="en-US" dirty="0">
+              <a:solidFill>
+                <a:srgbClr val="0070C0"/>
+              </a:solidFill>
+            </a:endParaRPr>
+          </a:p>
+        </p:txBody>
+      </p:sp>
+      <p:sp>
+        <p:nvSpPr>
+          <p:cNvPr id="14" name="CuadroTexto 13"/>
+          <p:cNvSpPr txBox="1"/>
+          <p:nvPr/>
+        </p:nvSpPr>
+        <p:spPr>
+          <a:xfrm>
+            <a:off x="4937761" y="-64417"/>
             <a:ext cx="4545874" cy="2862322"/>
           </a:xfrm>
           <a:prstGeom prst="rect">
@@ -8671,7 +8776,7 @@
                   <a:schemeClr val="tx1"/>
                 </a:solidFill>
               </a:rPr>
-              <a:t>#9</a:t>
+              <a:t>#10</a:t>
             </a:r>
           </a:p>
           <a:p>
@@ -8681,136 +8786,16 @@
                   <a:schemeClr val="tx1"/>
                 </a:solidFill>
               </a:rPr>
-              <a:t>   </a:t>
-            </a:r>
-            <a:r>
-              <a:rPr lang="es-MX" sz="7200" dirty="0" smtClean="0">
-                <a:solidFill>
-                  <a:schemeClr val="tx1"/>
-                </a:solidFill>
-              </a:rPr>
-              <a:t>SECO		</a:t>
-            </a:r>
-            <a:endParaRPr lang="en-US" sz="7200" dirty="0">
-              <a:solidFill>
-                <a:schemeClr val="tx1"/>
-              </a:solidFill>
-            </a:endParaRPr>
-          </a:p>
-          <a:p>
-            <a:r>
-              <a:rPr lang="es-MX" dirty="0" smtClean="0">
-                <a:solidFill>
-                  <a:srgbClr val="0070C0"/>
-                </a:solidFill>
-              </a:rPr>
-              <a:t> </a:t>
-            </a:r>
-            <a:endParaRPr lang="en-US" dirty="0">
-              <a:solidFill>
-                <a:srgbClr val="0070C0"/>
-              </a:solidFill>
-            </a:endParaRPr>
-          </a:p>
-        </p:txBody>
-      </p:sp>
-      <p:sp>
-        <p:nvSpPr>
-          <p:cNvPr id="14" name="CuadroTexto 13"/>
-          <p:cNvSpPr txBox="1"/>
-          <p:nvPr/>
-        </p:nvSpPr>
-        <p:spPr>
-          <a:xfrm>
-            <a:off x="4937761" y="-64417"/>
-            <a:ext cx="4545874" cy="3139321"/>
-          </a:xfrm>
-          <a:prstGeom prst="rect">
-            <a:avLst/>
-          </a:prstGeom>
-          <a:ln>
-            <a:noFill/>
-          </a:ln>
-        </p:spPr>
-        <p:style>
-          <a:lnRef idx="2">
-            <a:schemeClr val="dk1"/>
-          </a:lnRef>
-          <a:fillRef idx="1">
-            <a:schemeClr val="lt1"/>
-          </a:fillRef>
-          <a:effectRef idx="0">
-            <a:schemeClr val="dk1"/>
-          </a:effectRef>
-          <a:fontRef idx="minor">
-            <a:schemeClr val="dk1"/>
-          </a:fontRef>
-        </p:style>
-        <p:txBody>
-          <a:bodyPr wrap="square" rtlCol="0">
-            <a:spAutoFit/>
-          </a:bodyPr>
-          <a:lstStyle/>
-          <a:p>
-            <a:r>
-              <a:rPr lang="es-MX" dirty="0"/>
-              <a:t> </a:t>
-            </a:r>
-            <a:r>
-              <a:rPr lang="es-MX" dirty="0" smtClean="0"/>
-              <a:t>           </a:t>
-            </a:r>
-          </a:p>
-          <a:p>
-            <a:r>
-              <a:rPr lang="es-MX" dirty="0"/>
-              <a:t> </a:t>
-            </a:r>
-            <a:r>
-              <a:rPr lang="es-MX" dirty="0" smtClean="0"/>
-              <a:t>          </a:t>
-            </a:r>
-            <a:r>
-              <a:rPr lang="es-MX" sz="7200" dirty="0" smtClean="0">
-                <a:solidFill>
-                  <a:schemeClr val="tx1"/>
-                </a:solidFill>
-              </a:rPr>
-              <a:t>BULTO</a:t>
-            </a:r>
-            <a:r>
-              <a:rPr lang="en-US" sz="7200" dirty="0" smtClean="0">
-                <a:solidFill>
-                  <a:schemeClr val="tx1"/>
-                </a:solidFill>
-              </a:rPr>
-              <a:t>#10</a:t>
-            </a:r>
-          </a:p>
-          <a:p>
-            <a:r>
-              <a:rPr lang="es-MX" sz="7200" dirty="0" smtClean="0">
-                <a:solidFill>
-                  <a:schemeClr val="tx1"/>
-                </a:solidFill>
-              </a:rPr>
-              <a:t>  </a:t>
-            </a:r>
-            <a:r>
-              <a:rPr lang="es-MX" sz="7200" dirty="0" smtClean="0">
-                <a:solidFill>
-                  <a:schemeClr val="tx1"/>
-                </a:solidFill>
-              </a:rPr>
-              <a:t>SECO</a:t>
-            </a:r>
-            <a:endParaRPr lang="en-US" sz="7200" dirty="0">
-              <a:solidFill>
-                <a:schemeClr val="tx1"/>
-              </a:solidFill>
-            </a:endParaRPr>
-          </a:p>
-          <a:p>
+              <a:t> </a:t>
+            </a:r>
+            <a:r>
+              <a:rPr lang="es-MX" sz="7200" dirty="0">
+                <a:solidFill>
+                  <a:schemeClr val="tx1"/>
+                </a:solidFill>
+              </a:rPr>
+              <a:t>FREEZER</a:t>
+            </a:r>
             <a:r>
               <a:rPr lang="es-MX" dirty="0" smtClean="0"/>
               <a:t> </a:t>
@@ -8990,7 +8975,7 @@
         <p:spPr>
           <a:xfrm>
             <a:off x="391887" y="3284025"/>
-            <a:ext cx="4545874" cy="3139321"/>
+            <a:ext cx="4545874" cy="2862322"/>
           </a:xfrm>
           <a:prstGeom prst="rect">
             <a:avLst/>
@@ -9061,23 +9046,16 @@
                   <a:schemeClr val="tx1"/>
                 </a:solidFill>
               </a:rPr>
-              <a:t>  </a:t>
-            </a:r>
-            <a:r>
-              <a:rPr lang="es-MX" sz="7200" dirty="0" smtClean="0">
-                <a:solidFill>
-                  <a:schemeClr val="tx1"/>
-                </a:solidFill>
-              </a:rPr>
-              <a:t>SECO</a:t>
-            </a:r>
-            <a:endParaRPr lang="en-US" sz="7200" dirty="0">
-              <a:solidFill>
-                <a:schemeClr val="tx1"/>
-              </a:solidFill>
-            </a:endParaRPr>
-          </a:p>
-          <a:p>
+              <a:t> </a:t>
+            </a:r>
+            <a:r>
+              <a:rPr lang="es-MX" sz="7200" dirty="0">
+                <a:solidFill>
+                  <a:schemeClr val="tx1"/>
+                </a:solidFill>
+              </a:rPr>
+              <a:t>FREEZER</a:t>
+            </a:r>
             <a:r>
               <a:rPr lang="es-MX" dirty="0" smtClean="0">
                 <a:solidFill>
@@ -9103,7 +9081,7 @@
         <p:spPr>
           <a:xfrm>
             <a:off x="4937761" y="3284026"/>
-            <a:ext cx="4545874" cy="3139321"/>
+            <a:ext cx="4545874" cy="2862322"/>
           </a:xfrm>
           <a:prstGeom prst="rect">
             <a:avLst/>
@@ -9174,23 +9152,16 @@
                   <a:schemeClr val="tx1"/>
                 </a:solidFill>
               </a:rPr>
-              <a:t>  </a:t>
-            </a:r>
-            <a:r>
-              <a:rPr lang="es-MX" sz="7200" dirty="0" smtClean="0">
-                <a:solidFill>
-                  <a:schemeClr val="tx1"/>
-                </a:solidFill>
-              </a:rPr>
-              <a:t>SECO</a:t>
-            </a:r>
-            <a:endParaRPr lang="en-US" sz="7200" dirty="0">
-              <a:solidFill>
-                <a:schemeClr val="tx1"/>
-              </a:solidFill>
-            </a:endParaRPr>
-          </a:p>
-          <a:p>
+              <a:t> </a:t>
+            </a:r>
+            <a:r>
+              <a:rPr lang="es-MX" sz="7200" dirty="0">
+                <a:solidFill>
+                  <a:schemeClr val="tx1"/>
+                </a:solidFill>
+              </a:rPr>
+              <a:t>FREEZER</a:t>
+            </a:r>
             <a:r>
               <a:rPr lang="es-MX" dirty="0" smtClean="0"/>
               <a:t> </a:t>
@@ -9748,15 +9719,7 @@
                   <a:schemeClr val="tx1"/>
                 </a:solidFill>
               </a:rPr>
-              <a:t>  </a:t>
-            </a:r>
-            <a:r>
-              <a:rPr lang="es-MX" sz="7200" dirty="0" smtClean="0">
-                <a:solidFill>
-                  <a:schemeClr val="tx1"/>
-                </a:solidFill>
-              </a:rPr>
-              <a:t>SECO</a:t>
+              <a:t>  SECO</a:t>
             </a:r>
             <a:endParaRPr lang="en-US" dirty="0"/>
           </a:p>
@@ -10223,15 +10186,7 @@
                   <a:schemeClr val="tx1"/>
                 </a:solidFill>
               </a:rPr>
-              <a:t>  </a:t>
-            </a:r>
-            <a:r>
-              <a:rPr lang="es-MX" sz="7200" dirty="0" smtClean="0">
-                <a:solidFill>
-                  <a:schemeClr val="tx1"/>
-                </a:solidFill>
-              </a:rPr>
-              <a:t>SECO</a:t>
+              <a:t>  SECO</a:t>
             </a:r>
             <a:endParaRPr lang="en-US" sz="7200" dirty="0">
               <a:solidFill>
@@ -10417,15 +10372,7 @@
                   <a:schemeClr val="tx1"/>
                 </a:solidFill>
               </a:rPr>
-              <a:t>  </a:t>
-            </a:r>
-            <a:r>
-              <a:rPr lang="es-MX" sz="7200" dirty="0" smtClean="0">
-                <a:solidFill>
-                  <a:schemeClr val="tx1"/>
-                </a:solidFill>
-              </a:rPr>
-              <a:t>SECO</a:t>
+              <a:t>  SECO</a:t>
             </a:r>
             <a:endParaRPr lang="en-US" sz="7200" dirty="0">
               <a:solidFill>
@@ -10637,15 +10584,7 @@
                   <a:schemeClr val="tx1"/>
                 </a:solidFill>
               </a:rPr>
-              <a:t>  </a:t>
-            </a:r>
-            <a:r>
-              <a:rPr lang="es-MX" sz="7200" dirty="0" smtClean="0">
-                <a:solidFill>
-                  <a:schemeClr val="tx1"/>
-                </a:solidFill>
-              </a:rPr>
-              <a:t>SECO</a:t>
+              <a:t>  SECO</a:t>
             </a:r>
             <a:endParaRPr lang="en-US" sz="7200" dirty="0">
               <a:solidFill>

</xml_diff>